<commit_message>
Update 11.Spring Security JWT.pptx
</commit_message>
<xml_diff>
--- a/11.Spring Security JWT.pptx
+++ b/11.Spring Security JWT.pptx
@@ -18,6 +18,10 @@
     <p:sldId id="468" r:id="rId12"/>
     <p:sldId id="436" r:id="rId13"/>
     <p:sldId id="469" r:id="rId14"/>
+    <p:sldId id="470" r:id="rId15"/>
+    <p:sldId id="471" r:id="rId16"/>
+    <p:sldId id="472" r:id="rId17"/>
+    <p:sldId id="473" r:id="rId18"/>
   </p:sldIdLst>
   <p:sldSz cx="12192000" cy="6858000"/>
   <p:notesSz cx="6858000" cy="9144000"/>
@@ -848,7 +852,7 @@
           <a:p>
             <a:fld id="{E7E49A89-72C0-40C6-A55C-C6C12D525ACC}" type="datetimeFigureOut">
               <a:rPr lang="en-US" smtClean="0"/>
-              <a:t>10/15/2024</a:t>
+              <a:t>10/22/2024</a:t>
             </a:fld>
             <a:endParaRPr lang="en-US"/>
           </a:p>
@@ -1099,7 +1103,7 @@
           <a:p>
             <a:fld id="{E7E49A89-72C0-40C6-A55C-C6C12D525ACC}" type="datetimeFigureOut">
               <a:rPr lang="en-US" smtClean="0"/>
-              <a:t>10/15/2024</a:t>
+              <a:t>10/22/2024</a:t>
             </a:fld>
             <a:endParaRPr lang="en-US"/>
           </a:p>
@@ -1413,7 +1417,7 @@
           <a:p>
             <a:fld id="{E7E49A89-72C0-40C6-A55C-C6C12D525ACC}" type="datetimeFigureOut">
               <a:rPr lang="en-US" smtClean="0"/>
-              <a:t>10/15/2024</a:t>
+              <a:t>10/22/2024</a:t>
             </a:fld>
             <a:endParaRPr lang="en-US"/>
           </a:p>
@@ -1740,7 +1744,7 @@
           <a:p>
             <a:fld id="{E7E49A89-72C0-40C6-A55C-C6C12D525ACC}" type="datetimeFigureOut">
               <a:rPr lang="en-US" smtClean="0"/>
-              <a:t>10/15/2024</a:t>
+              <a:t>10/22/2024</a:t>
             </a:fld>
             <a:endParaRPr lang="en-US"/>
           </a:p>
@@ -2054,7 +2058,7 @@
           <a:p>
             <a:fld id="{E7E49A89-72C0-40C6-A55C-C6C12D525ACC}" type="datetimeFigureOut">
               <a:rPr lang="en-US" smtClean="0"/>
-              <a:t>10/15/2024</a:t>
+              <a:t>10/22/2024</a:t>
             </a:fld>
             <a:endParaRPr lang="en-US"/>
           </a:p>
@@ -2441,7 +2445,7 @@
           <a:p>
             <a:fld id="{E7E49A89-72C0-40C6-A55C-C6C12D525ACC}" type="datetimeFigureOut">
               <a:rPr lang="en-US" smtClean="0"/>
-              <a:t>10/15/2024</a:t>
+              <a:t>10/22/2024</a:t>
             </a:fld>
             <a:endParaRPr lang="en-US"/>
           </a:p>
@@ -2611,7 +2615,7 @@
           <a:p>
             <a:fld id="{E7E49A89-72C0-40C6-A55C-C6C12D525ACC}" type="datetimeFigureOut">
               <a:rPr lang="en-US" smtClean="0"/>
-              <a:t>10/15/2024</a:t>
+              <a:t>10/22/2024</a:t>
             </a:fld>
             <a:endParaRPr lang="en-US"/>
           </a:p>
@@ -2791,7 +2795,7 @@
           <a:p>
             <a:fld id="{E7E49A89-72C0-40C6-A55C-C6C12D525ACC}" type="datetimeFigureOut">
               <a:rPr lang="en-US" smtClean="0"/>
-              <a:t>10/15/2024</a:t>
+              <a:t>10/22/2024</a:t>
             </a:fld>
             <a:endParaRPr lang="en-US"/>
           </a:p>
@@ -2967,7 +2971,7 @@
           <a:p>
             <a:fld id="{E7E49A89-72C0-40C6-A55C-C6C12D525ACC}" type="datetimeFigureOut">
               <a:rPr lang="en-US" smtClean="0"/>
-              <a:t>10/15/2024</a:t>
+              <a:t>10/22/2024</a:t>
             </a:fld>
             <a:endParaRPr lang="en-US"/>
           </a:p>
@@ -3214,7 +3218,7 @@
           <a:p>
             <a:fld id="{E7E49A89-72C0-40C6-A55C-C6C12D525ACC}" type="datetimeFigureOut">
               <a:rPr lang="en-US" smtClean="0"/>
-              <a:t>10/15/2024</a:t>
+              <a:t>10/22/2024</a:t>
             </a:fld>
             <a:endParaRPr lang="en-US"/>
           </a:p>
@@ -3446,7 +3450,7 @@
           <a:p>
             <a:fld id="{E7E49A89-72C0-40C6-A55C-C6C12D525ACC}" type="datetimeFigureOut">
               <a:rPr lang="en-US" smtClean="0"/>
-              <a:t>10/15/2024</a:t>
+              <a:t>10/22/2024</a:t>
             </a:fld>
             <a:endParaRPr lang="en-US"/>
           </a:p>
@@ -3820,7 +3824,7 @@
           <a:p>
             <a:fld id="{E7E49A89-72C0-40C6-A55C-C6C12D525ACC}" type="datetimeFigureOut">
               <a:rPr lang="en-US" smtClean="0"/>
-              <a:t>10/15/2024</a:t>
+              <a:t>10/22/2024</a:t>
             </a:fld>
             <a:endParaRPr lang="en-US"/>
           </a:p>
@@ -3943,7 +3947,7 @@
           <a:p>
             <a:fld id="{E7E49A89-72C0-40C6-A55C-C6C12D525ACC}" type="datetimeFigureOut">
               <a:rPr lang="en-US" smtClean="0"/>
-              <a:t>10/15/2024</a:t>
+              <a:t>10/22/2024</a:t>
             </a:fld>
             <a:endParaRPr lang="en-US"/>
           </a:p>
@@ -4038,7 +4042,7 @@
           <a:p>
             <a:fld id="{E7E49A89-72C0-40C6-A55C-C6C12D525ACC}" type="datetimeFigureOut">
               <a:rPr lang="en-US" smtClean="0"/>
-              <a:t>10/15/2024</a:t>
+              <a:t>10/22/2024</a:t>
             </a:fld>
             <a:endParaRPr lang="en-US"/>
           </a:p>
@@ -4293,7 +4297,7 @@
           <a:p>
             <a:fld id="{E7E49A89-72C0-40C6-A55C-C6C12D525ACC}" type="datetimeFigureOut">
               <a:rPr lang="en-US" smtClean="0"/>
-              <a:t>10/15/2024</a:t>
+              <a:t>10/22/2024</a:t>
             </a:fld>
             <a:endParaRPr lang="en-US"/>
           </a:p>
@@ -4555,7 +4559,7 @@
           <a:p>
             <a:fld id="{E7E49A89-72C0-40C6-A55C-C6C12D525ACC}" type="datetimeFigureOut">
               <a:rPr lang="en-US" smtClean="0"/>
-              <a:t>10/15/2024</a:t>
+              <a:t>10/22/2024</a:t>
             </a:fld>
             <a:endParaRPr lang="en-US"/>
           </a:p>
@@ -5300,7 +5304,7 @@
           <a:p>
             <a:fld id="{E7E49A89-72C0-40C6-A55C-C6C12D525ACC}" type="datetimeFigureOut">
               <a:rPr lang="en-US" smtClean="0"/>
-              <a:t>10/15/2024</a:t>
+              <a:t>10/22/2024</a:t>
             </a:fld>
             <a:endParaRPr lang="en-US"/>
           </a:p>
@@ -6195,7 +6199,7 @@
                 <a:latin typeface="Arial" panose="020B0604020202020204" pitchFamily="34" charset="0"/>
                 <a:cs typeface="Arial" panose="020B0604020202020204" pitchFamily="34" charset="0"/>
               </a:rPr>
-              <a:t>Theo như hoạt động của JWT, để áp dụng vào Spring ta có thể nhận thấy rằng cần phải có 2 chức năng:</a:t>
+              <a:t>Theo như hoạt động của JWT, để áp dụng vào Spring ta có thể nhận thấy rằng cần phải có 3 chức năng:</a:t>
             </a:r>
           </a:p>
           <a:p>
@@ -6205,7 +6209,7 @@
                 <a:latin typeface="Arial" panose="020B0604020202020204" pitchFamily="34" charset="0"/>
                 <a:cs typeface="Arial" panose="020B0604020202020204" pitchFamily="34" charset="0"/>
               </a:rPr>
-              <a:t>Chức năng tạo token JWT</a:t>
+              <a:t>Chức năng generate token JWT</a:t>
             </a:r>
           </a:p>
           <a:p>
@@ -6215,7 +6219,17 @@
                 <a:latin typeface="Arial" panose="020B0604020202020204" pitchFamily="34" charset="0"/>
                 <a:cs typeface="Arial" panose="020B0604020202020204" pitchFamily="34" charset="0"/>
               </a:rPr>
-              <a:t>Chức năng verify token JWT</a:t>
+              <a:t>Chức năng validate token JWT</a:t>
+            </a:r>
+          </a:p>
+          <a:p>
+            <a:pPr lvl="1"/>
+            <a:r>
+              <a:rPr lang="en-US">
+                <a:latin typeface="Arial" panose="020B0604020202020204" pitchFamily="34" charset="0"/>
+                <a:cs typeface="Arial" panose="020B0604020202020204" pitchFamily="34" charset="0"/>
+              </a:rPr>
+              <a:t>Chức năng extract thông tin từ token JWT</a:t>
             </a:r>
           </a:p>
           <a:p>
@@ -6532,6 +6546,609 @@
     <p:extLst>
       <p:ext uri="{BB962C8B-B14F-4D97-AF65-F5344CB8AC3E}">
         <p14:creationId xmlns:p14="http://schemas.microsoft.com/office/powerpoint/2010/main" val="44970790"/>
+      </p:ext>
+    </p:extLst>
+  </p:cSld>
+  <p:clrMapOvr>
+    <a:masterClrMapping/>
+  </p:clrMapOvr>
+</p:sld>
+</file>
+
+<file path=ppt/slides/slide14.xml><?xml version="1.0" encoding="utf-8"?>
+<p:sld xmlns:a="http://schemas.openxmlformats.org/drawingml/2006/main" xmlns:r="http://schemas.openxmlformats.org/officeDocument/2006/relationships" xmlns:p="http://schemas.openxmlformats.org/presentationml/2006/main">
+  <p:cSld>
+    <p:spTree>
+      <p:nvGrpSpPr>
+        <p:cNvPr id="1" name="">
+          <a:extLst>
+            <a:ext uri="{FF2B5EF4-FFF2-40B4-BE49-F238E27FC236}">
+              <a16:creationId xmlns:a16="http://schemas.microsoft.com/office/drawing/2014/main" id="{DB731DB0-D289-AA8A-1919-E6C3FFBC763A}"/>
+            </a:ext>
+          </a:extLst>
+        </p:cNvPr>
+        <p:cNvGrpSpPr/>
+        <p:nvPr/>
+      </p:nvGrpSpPr>
+      <p:grpSpPr>
+        <a:xfrm>
+          <a:off x="0" y="0"/>
+          <a:ext cx="0" cy="0"/>
+          <a:chOff x="0" y="0"/>
+          <a:chExt cx="0" cy="0"/>
+        </a:xfrm>
+      </p:grpSpPr>
+      <p:sp>
+        <p:nvSpPr>
+          <p:cNvPr id="2" name="Title 1">
+            <a:extLst>
+              <a:ext uri="{FF2B5EF4-FFF2-40B4-BE49-F238E27FC236}">
+                <a16:creationId xmlns:a16="http://schemas.microsoft.com/office/drawing/2014/main" id="{42EE7239-7338-B249-47BA-B03B54EFB9B5}"/>
+              </a:ext>
+            </a:extLst>
+          </p:cNvPr>
+          <p:cNvSpPr>
+            <a:spLocks noGrp="1"/>
+          </p:cNvSpPr>
+          <p:nvPr>
+            <p:ph type="title"/>
+          </p:nvPr>
+        </p:nvSpPr>
+        <p:spPr/>
+        <p:txBody>
+          <a:bodyPr/>
+          <a:lstStyle/>
+          <a:p>
+            <a:r>
+              <a:rPr lang="en-US">
+                <a:latin typeface="Arial" panose="020B0604020202020204" pitchFamily="34" charset="0"/>
+                <a:cs typeface="Arial" panose="020B0604020202020204" pitchFamily="34" charset="0"/>
+              </a:rPr>
+              <a:t>Implement</a:t>
+            </a:r>
+          </a:p>
+        </p:txBody>
+      </p:sp>
+      <p:sp>
+        <p:nvSpPr>
+          <p:cNvPr id="3" name="Content Placeholder 2">
+            <a:extLst>
+              <a:ext uri="{FF2B5EF4-FFF2-40B4-BE49-F238E27FC236}">
+                <a16:creationId xmlns:a16="http://schemas.microsoft.com/office/drawing/2014/main" id="{9362AD2B-DA42-FF2E-02DB-7BC3F3477916}"/>
+              </a:ext>
+            </a:extLst>
+          </p:cNvPr>
+          <p:cNvSpPr>
+            <a:spLocks noGrp="1"/>
+          </p:cNvSpPr>
+          <p:nvPr>
+            <p:ph idx="1"/>
+          </p:nvPr>
+        </p:nvSpPr>
+        <p:spPr/>
+        <p:txBody>
+          <a:bodyPr>
+            <a:normAutofit/>
+          </a:bodyPr>
+          <a:lstStyle/>
+          <a:p>
+            <a:r>
+              <a:rPr lang="en-US">
+                <a:latin typeface="Arial" panose="020B0604020202020204" pitchFamily="34" charset="0"/>
+                <a:cs typeface="Arial" panose="020B0604020202020204" pitchFamily="34" charset="0"/>
+              </a:rPr>
+              <a:t>Đầu tiên tạo các chức năng đã liệt kê ở trên:</a:t>
+            </a:r>
+          </a:p>
+          <a:p>
+            <a:pPr lvl="1"/>
+            <a:r>
+              <a:rPr lang="en-US">
+                <a:latin typeface="Arial" panose="020B0604020202020204" pitchFamily="34" charset="0"/>
+                <a:cs typeface="Arial" panose="020B0604020202020204" pitchFamily="34" charset="0"/>
+              </a:rPr>
+              <a:t>Generate token</a:t>
+            </a:r>
+          </a:p>
+          <a:p>
+            <a:pPr lvl="1"/>
+            <a:r>
+              <a:rPr lang="en-US">
+                <a:latin typeface="Arial" panose="020B0604020202020204" pitchFamily="34" charset="0"/>
+                <a:cs typeface="Arial" panose="020B0604020202020204" pitchFamily="34" charset="0"/>
+              </a:rPr>
+              <a:t>Validate token</a:t>
+            </a:r>
+          </a:p>
+          <a:p>
+            <a:pPr lvl="1"/>
+            <a:r>
+              <a:rPr lang="en-US">
+                <a:latin typeface="Arial" panose="020B0604020202020204" pitchFamily="34" charset="0"/>
+                <a:cs typeface="Arial" panose="020B0604020202020204" pitchFamily="34" charset="0"/>
+              </a:rPr>
+              <a:t>Extract token</a:t>
+            </a:r>
+          </a:p>
+          <a:p>
+            <a:pPr lvl="1"/>
+            <a:endParaRPr lang="en-US">
+              <a:latin typeface="Arial" panose="020B0604020202020204" pitchFamily="34" charset="0"/>
+              <a:cs typeface="Arial" panose="020B0604020202020204" pitchFamily="34" charset="0"/>
+            </a:endParaRPr>
+          </a:p>
+          <a:p>
+            <a:endParaRPr lang="en-US">
+              <a:latin typeface="Arial" panose="020B0604020202020204" pitchFamily="34" charset="0"/>
+              <a:cs typeface="Arial" panose="020B0604020202020204" pitchFamily="34" charset="0"/>
+            </a:endParaRPr>
+          </a:p>
+          <a:p>
+            <a:endParaRPr lang="en-US">
+              <a:latin typeface="Arial" panose="020B0604020202020204" pitchFamily="34" charset="0"/>
+              <a:cs typeface="Arial" panose="020B0604020202020204" pitchFamily="34" charset="0"/>
+            </a:endParaRPr>
+          </a:p>
+          <a:p>
+            <a:endParaRPr lang="en-US">
+              <a:latin typeface="Arial" panose="020B0604020202020204" pitchFamily="34" charset="0"/>
+              <a:cs typeface="Arial" panose="020B0604020202020204" pitchFamily="34" charset="0"/>
+            </a:endParaRPr>
+          </a:p>
+          <a:p>
+            <a:endParaRPr lang="en-US">
+              <a:latin typeface="Arial" panose="020B0604020202020204" pitchFamily="34" charset="0"/>
+              <a:cs typeface="Arial" panose="020B0604020202020204" pitchFamily="34" charset="0"/>
+            </a:endParaRPr>
+          </a:p>
+          <a:p>
+            <a:endParaRPr lang="en-US">
+              <a:latin typeface="Arial" panose="020B0604020202020204" pitchFamily="34" charset="0"/>
+              <a:cs typeface="Arial" panose="020B0604020202020204" pitchFamily="34" charset="0"/>
+            </a:endParaRPr>
+          </a:p>
+          <a:p>
+            <a:endParaRPr lang="en-US">
+              <a:latin typeface="Arial" panose="020B0604020202020204" pitchFamily="34" charset="0"/>
+              <a:cs typeface="Arial" panose="020B0604020202020204" pitchFamily="34" charset="0"/>
+            </a:endParaRPr>
+          </a:p>
+        </p:txBody>
+      </p:sp>
+    </p:spTree>
+    <p:extLst>
+      <p:ext uri="{BB962C8B-B14F-4D97-AF65-F5344CB8AC3E}">
+        <p14:creationId xmlns:p14="http://schemas.microsoft.com/office/powerpoint/2010/main" val="26956544"/>
+      </p:ext>
+    </p:extLst>
+  </p:cSld>
+  <p:clrMapOvr>
+    <a:masterClrMapping/>
+  </p:clrMapOvr>
+</p:sld>
+</file>
+
+<file path=ppt/slides/slide15.xml><?xml version="1.0" encoding="utf-8"?>
+<p:sld xmlns:a="http://schemas.openxmlformats.org/drawingml/2006/main" xmlns:r="http://schemas.openxmlformats.org/officeDocument/2006/relationships" xmlns:p="http://schemas.openxmlformats.org/presentationml/2006/main">
+  <p:cSld>
+    <p:spTree>
+      <p:nvGrpSpPr>
+        <p:cNvPr id="1" name="">
+          <a:extLst>
+            <a:ext uri="{FF2B5EF4-FFF2-40B4-BE49-F238E27FC236}">
+              <a16:creationId xmlns:a16="http://schemas.microsoft.com/office/drawing/2014/main" id="{48D3C987-C254-1383-6AD9-2D91C0F657A7}"/>
+            </a:ext>
+          </a:extLst>
+        </p:cNvPr>
+        <p:cNvGrpSpPr/>
+        <p:nvPr/>
+      </p:nvGrpSpPr>
+      <p:grpSpPr>
+        <a:xfrm>
+          <a:off x="0" y="0"/>
+          <a:ext cx="0" cy="0"/>
+          <a:chOff x="0" y="0"/>
+          <a:chExt cx="0" cy="0"/>
+        </a:xfrm>
+      </p:grpSpPr>
+      <p:sp>
+        <p:nvSpPr>
+          <p:cNvPr id="2" name="Title 1">
+            <a:extLst>
+              <a:ext uri="{FF2B5EF4-FFF2-40B4-BE49-F238E27FC236}">
+                <a16:creationId xmlns:a16="http://schemas.microsoft.com/office/drawing/2014/main" id="{89D2EE01-4F18-63F1-D379-3EDBF3F4E862}"/>
+              </a:ext>
+            </a:extLst>
+          </p:cNvPr>
+          <p:cNvSpPr>
+            <a:spLocks noGrp="1"/>
+          </p:cNvSpPr>
+          <p:nvPr>
+            <p:ph type="title"/>
+          </p:nvPr>
+        </p:nvSpPr>
+        <p:spPr/>
+        <p:txBody>
+          <a:bodyPr/>
+          <a:lstStyle/>
+          <a:p>
+            <a:r>
+              <a:rPr lang="en-US">
+                <a:latin typeface="Arial" panose="020B0604020202020204" pitchFamily="34" charset="0"/>
+                <a:cs typeface="Arial" panose="020B0604020202020204" pitchFamily="34" charset="0"/>
+              </a:rPr>
+              <a:t>Implement</a:t>
+            </a:r>
+          </a:p>
+        </p:txBody>
+      </p:sp>
+      <p:sp>
+        <p:nvSpPr>
+          <p:cNvPr id="3" name="Content Placeholder 2">
+            <a:extLst>
+              <a:ext uri="{FF2B5EF4-FFF2-40B4-BE49-F238E27FC236}">
+                <a16:creationId xmlns:a16="http://schemas.microsoft.com/office/drawing/2014/main" id="{7A800256-D5EC-F6AD-90FD-5C957D161105}"/>
+              </a:ext>
+            </a:extLst>
+          </p:cNvPr>
+          <p:cNvSpPr>
+            <a:spLocks noGrp="1"/>
+          </p:cNvSpPr>
+          <p:nvPr>
+            <p:ph idx="1"/>
+          </p:nvPr>
+        </p:nvSpPr>
+        <p:spPr/>
+        <p:txBody>
+          <a:bodyPr>
+            <a:normAutofit/>
+          </a:bodyPr>
+          <a:lstStyle/>
+          <a:p>
+            <a:r>
+              <a:rPr lang="en-US">
+                <a:latin typeface="Arial" panose="020B0604020202020204" pitchFamily="34" charset="0"/>
+                <a:cs typeface="Arial" panose="020B0604020202020204" pitchFamily="34" charset="0"/>
+              </a:rPr>
+              <a:t>Bây giờ chúng ta cần add thêm chức năng filter, tức là chặn request lại kiểm tra token.</a:t>
+            </a:r>
+          </a:p>
+          <a:p>
+            <a:pPr lvl="1"/>
+            <a:r>
+              <a:rPr lang="en-US">
+                <a:latin typeface="Arial" panose="020B0604020202020204" pitchFamily="34" charset="0"/>
+                <a:cs typeface="Arial" panose="020B0604020202020204" pitchFamily="34" charset="0"/>
+              </a:rPr>
+              <a:t>Nếu OK thì bypass</a:t>
+            </a:r>
+          </a:p>
+          <a:p>
+            <a:pPr lvl="1"/>
+            <a:r>
+              <a:rPr lang="en-US">
+                <a:latin typeface="Arial" panose="020B0604020202020204" pitchFamily="34" charset="0"/>
+                <a:cs typeface="Arial" panose="020B0604020202020204" pitchFamily="34" charset="0"/>
+              </a:rPr>
+              <a:t>Nếu NG thì trả về thông báo lỗi cho user</a:t>
+            </a:r>
+          </a:p>
+          <a:p>
+            <a:endParaRPr lang="en-US">
+              <a:latin typeface="Arial" panose="020B0604020202020204" pitchFamily="34" charset="0"/>
+              <a:cs typeface="Arial" panose="020B0604020202020204" pitchFamily="34" charset="0"/>
+            </a:endParaRPr>
+          </a:p>
+          <a:p>
+            <a:endParaRPr lang="en-US">
+              <a:latin typeface="Arial" panose="020B0604020202020204" pitchFamily="34" charset="0"/>
+              <a:cs typeface="Arial" panose="020B0604020202020204" pitchFamily="34" charset="0"/>
+            </a:endParaRPr>
+          </a:p>
+          <a:p>
+            <a:endParaRPr lang="en-US">
+              <a:latin typeface="Arial" panose="020B0604020202020204" pitchFamily="34" charset="0"/>
+              <a:cs typeface="Arial" panose="020B0604020202020204" pitchFamily="34" charset="0"/>
+            </a:endParaRPr>
+          </a:p>
+          <a:p>
+            <a:endParaRPr lang="en-US">
+              <a:latin typeface="Arial" panose="020B0604020202020204" pitchFamily="34" charset="0"/>
+              <a:cs typeface="Arial" panose="020B0604020202020204" pitchFamily="34" charset="0"/>
+            </a:endParaRPr>
+          </a:p>
+          <a:p>
+            <a:endParaRPr lang="en-US">
+              <a:latin typeface="Arial" panose="020B0604020202020204" pitchFamily="34" charset="0"/>
+              <a:cs typeface="Arial" panose="020B0604020202020204" pitchFamily="34" charset="0"/>
+            </a:endParaRPr>
+          </a:p>
+        </p:txBody>
+      </p:sp>
+    </p:spTree>
+    <p:extLst>
+      <p:ext uri="{BB962C8B-B14F-4D97-AF65-F5344CB8AC3E}">
+        <p14:creationId xmlns:p14="http://schemas.microsoft.com/office/powerpoint/2010/main" val="3474883078"/>
+      </p:ext>
+    </p:extLst>
+  </p:cSld>
+  <p:clrMapOvr>
+    <a:masterClrMapping/>
+  </p:clrMapOvr>
+</p:sld>
+</file>
+
+<file path=ppt/slides/slide16.xml><?xml version="1.0" encoding="utf-8"?>
+<p:sld xmlns:a="http://schemas.openxmlformats.org/drawingml/2006/main" xmlns:r="http://schemas.openxmlformats.org/officeDocument/2006/relationships" xmlns:p="http://schemas.openxmlformats.org/presentationml/2006/main">
+  <p:cSld>
+    <p:spTree>
+      <p:nvGrpSpPr>
+        <p:cNvPr id="1" name="">
+          <a:extLst>
+            <a:ext uri="{FF2B5EF4-FFF2-40B4-BE49-F238E27FC236}">
+              <a16:creationId xmlns:a16="http://schemas.microsoft.com/office/drawing/2014/main" id="{611B3A74-7BF6-28FF-9DBD-B8152049503D}"/>
+            </a:ext>
+          </a:extLst>
+        </p:cNvPr>
+        <p:cNvGrpSpPr/>
+        <p:nvPr/>
+      </p:nvGrpSpPr>
+      <p:grpSpPr>
+        <a:xfrm>
+          <a:off x="0" y="0"/>
+          <a:ext cx="0" cy="0"/>
+          <a:chOff x="0" y="0"/>
+          <a:chExt cx="0" cy="0"/>
+        </a:xfrm>
+      </p:grpSpPr>
+      <p:sp>
+        <p:nvSpPr>
+          <p:cNvPr id="2" name="Title 1">
+            <a:extLst>
+              <a:ext uri="{FF2B5EF4-FFF2-40B4-BE49-F238E27FC236}">
+                <a16:creationId xmlns:a16="http://schemas.microsoft.com/office/drawing/2014/main" id="{EAD7C588-9C96-60CB-1FFC-D50495D3399E}"/>
+              </a:ext>
+            </a:extLst>
+          </p:cNvPr>
+          <p:cNvSpPr>
+            <a:spLocks noGrp="1"/>
+          </p:cNvSpPr>
+          <p:nvPr>
+            <p:ph type="title"/>
+          </p:nvPr>
+        </p:nvSpPr>
+        <p:spPr/>
+        <p:txBody>
+          <a:bodyPr/>
+          <a:lstStyle/>
+          <a:p>
+            <a:r>
+              <a:rPr lang="en-US">
+                <a:latin typeface="Arial" panose="020B0604020202020204" pitchFamily="34" charset="0"/>
+                <a:cs typeface="Arial" panose="020B0604020202020204" pitchFamily="34" charset="0"/>
+              </a:rPr>
+              <a:t>Implement</a:t>
+            </a:r>
+          </a:p>
+        </p:txBody>
+      </p:sp>
+      <p:sp>
+        <p:nvSpPr>
+          <p:cNvPr id="3" name="Content Placeholder 2">
+            <a:extLst>
+              <a:ext uri="{FF2B5EF4-FFF2-40B4-BE49-F238E27FC236}">
+                <a16:creationId xmlns:a16="http://schemas.microsoft.com/office/drawing/2014/main" id="{E465DA25-71CF-B14C-FA63-7DC1787FA44A}"/>
+              </a:ext>
+            </a:extLst>
+          </p:cNvPr>
+          <p:cNvSpPr>
+            <a:spLocks noGrp="1"/>
+          </p:cNvSpPr>
+          <p:nvPr>
+            <p:ph idx="1"/>
+          </p:nvPr>
+        </p:nvSpPr>
+        <p:spPr/>
+        <p:txBody>
+          <a:bodyPr>
+            <a:normAutofit/>
+          </a:bodyPr>
+          <a:lstStyle/>
+          <a:p>
+            <a:r>
+              <a:rPr lang="en-US">
+                <a:latin typeface="Arial" panose="020B0604020202020204" pitchFamily="34" charset="0"/>
+                <a:cs typeface="Arial" panose="020B0604020202020204" pitchFamily="34" charset="0"/>
+              </a:rPr>
+              <a:t>Bây giờ chúng ta cần add thêm chức năng filter, tức là chặn request lại kiểm tra token.</a:t>
+            </a:r>
+          </a:p>
+          <a:p>
+            <a:pPr lvl="1"/>
+            <a:r>
+              <a:rPr lang="en-US">
+                <a:latin typeface="Arial" panose="020B0604020202020204" pitchFamily="34" charset="0"/>
+                <a:cs typeface="Arial" panose="020B0604020202020204" pitchFamily="34" charset="0"/>
+              </a:rPr>
+              <a:t>Nếu OK thì bypass</a:t>
+            </a:r>
+          </a:p>
+          <a:p>
+            <a:pPr lvl="1"/>
+            <a:r>
+              <a:rPr lang="en-US">
+                <a:latin typeface="Arial" panose="020B0604020202020204" pitchFamily="34" charset="0"/>
+                <a:cs typeface="Arial" panose="020B0604020202020204" pitchFamily="34" charset="0"/>
+              </a:rPr>
+              <a:t>Nếu NG thì trả về thông báo lỗi cho user</a:t>
+            </a:r>
+          </a:p>
+          <a:p>
+            <a:endParaRPr lang="en-US">
+              <a:latin typeface="Arial" panose="020B0604020202020204" pitchFamily="34" charset="0"/>
+              <a:cs typeface="Arial" panose="020B0604020202020204" pitchFamily="34" charset="0"/>
+            </a:endParaRPr>
+          </a:p>
+          <a:p>
+            <a:endParaRPr lang="en-US">
+              <a:latin typeface="Arial" panose="020B0604020202020204" pitchFamily="34" charset="0"/>
+              <a:cs typeface="Arial" panose="020B0604020202020204" pitchFamily="34" charset="0"/>
+            </a:endParaRPr>
+          </a:p>
+          <a:p>
+            <a:endParaRPr lang="en-US">
+              <a:latin typeface="Arial" panose="020B0604020202020204" pitchFamily="34" charset="0"/>
+              <a:cs typeface="Arial" panose="020B0604020202020204" pitchFamily="34" charset="0"/>
+            </a:endParaRPr>
+          </a:p>
+          <a:p>
+            <a:endParaRPr lang="en-US">
+              <a:latin typeface="Arial" panose="020B0604020202020204" pitchFamily="34" charset="0"/>
+              <a:cs typeface="Arial" panose="020B0604020202020204" pitchFamily="34" charset="0"/>
+            </a:endParaRPr>
+          </a:p>
+          <a:p>
+            <a:endParaRPr lang="en-US">
+              <a:latin typeface="Arial" panose="020B0604020202020204" pitchFamily="34" charset="0"/>
+              <a:cs typeface="Arial" panose="020B0604020202020204" pitchFamily="34" charset="0"/>
+            </a:endParaRPr>
+          </a:p>
+        </p:txBody>
+      </p:sp>
+    </p:spTree>
+    <p:extLst>
+      <p:ext uri="{BB962C8B-B14F-4D97-AF65-F5344CB8AC3E}">
+        <p14:creationId xmlns:p14="http://schemas.microsoft.com/office/powerpoint/2010/main" val="3614269902"/>
+      </p:ext>
+    </p:extLst>
+  </p:cSld>
+  <p:clrMapOvr>
+    <a:masterClrMapping/>
+  </p:clrMapOvr>
+</p:sld>
+</file>
+
+<file path=ppt/slides/slide17.xml><?xml version="1.0" encoding="utf-8"?>
+<p:sld xmlns:a="http://schemas.openxmlformats.org/drawingml/2006/main" xmlns:r="http://schemas.openxmlformats.org/officeDocument/2006/relationships" xmlns:p="http://schemas.openxmlformats.org/presentationml/2006/main">
+  <p:cSld>
+    <p:spTree>
+      <p:nvGrpSpPr>
+        <p:cNvPr id="1" name="">
+          <a:extLst>
+            <a:ext uri="{FF2B5EF4-FFF2-40B4-BE49-F238E27FC236}">
+              <a16:creationId xmlns:a16="http://schemas.microsoft.com/office/drawing/2014/main" id="{4651CD78-FE11-317B-072F-421C47DEE640}"/>
+            </a:ext>
+          </a:extLst>
+        </p:cNvPr>
+        <p:cNvGrpSpPr/>
+        <p:nvPr/>
+      </p:nvGrpSpPr>
+      <p:grpSpPr>
+        <a:xfrm>
+          <a:off x="0" y="0"/>
+          <a:ext cx="0" cy="0"/>
+          <a:chOff x="0" y="0"/>
+          <a:chExt cx="0" cy="0"/>
+        </a:xfrm>
+      </p:grpSpPr>
+      <p:sp>
+        <p:nvSpPr>
+          <p:cNvPr id="2" name="Title 1">
+            <a:extLst>
+              <a:ext uri="{FF2B5EF4-FFF2-40B4-BE49-F238E27FC236}">
+                <a16:creationId xmlns:a16="http://schemas.microsoft.com/office/drawing/2014/main" id="{EDA538BF-AEBA-1188-4BF3-14366A52F07B}"/>
+              </a:ext>
+            </a:extLst>
+          </p:cNvPr>
+          <p:cNvSpPr>
+            <a:spLocks noGrp="1"/>
+          </p:cNvSpPr>
+          <p:nvPr>
+            <p:ph type="title"/>
+          </p:nvPr>
+        </p:nvSpPr>
+        <p:spPr/>
+        <p:txBody>
+          <a:bodyPr/>
+          <a:lstStyle/>
+          <a:p>
+            <a:r>
+              <a:rPr lang="en-US">
+                <a:latin typeface="Arial" panose="020B0604020202020204" pitchFamily="34" charset="0"/>
+                <a:cs typeface="Arial" panose="020B0604020202020204" pitchFamily="34" charset="0"/>
+              </a:rPr>
+              <a:t>Implement</a:t>
+            </a:r>
+          </a:p>
+        </p:txBody>
+      </p:sp>
+      <p:sp>
+        <p:nvSpPr>
+          <p:cNvPr id="3" name="Content Placeholder 2">
+            <a:extLst>
+              <a:ext uri="{FF2B5EF4-FFF2-40B4-BE49-F238E27FC236}">
+                <a16:creationId xmlns:a16="http://schemas.microsoft.com/office/drawing/2014/main" id="{B77E47D5-F130-BFCA-89FB-4CF27164456E}"/>
+              </a:ext>
+            </a:extLst>
+          </p:cNvPr>
+          <p:cNvSpPr>
+            <a:spLocks noGrp="1"/>
+          </p:cNvSpPr>
+          <p:nvPr>
+            <p:ph idx="1"/>
+          </p:nvPr>
+        </p:nvSpPr>
+        <p:spPr/>
+        <p:txBody>
+          <a:bodyPr>
+            <a:normAutofit/>
+          </a:bodyPr>
+          <a:lstStyle/>
+          <a:p>
+            <a:r>
+              <a:rPr lang="en-US">
+                <a:latin typeface="Arial" panose="020B0604020202020204" pitchFamily="34" charset="0"/>
+                <a:cs typeface="Arial" panose="020B0604020202020204" pitchFamily="34" charset="0"/>
+              </a:rPr>
+              <a:t>Tiếp theo làm sao để config nhận chức năng filter nữa là done</a:t>
+            </a:r>
+          </a:p>
+          <a:p>
+            <a:endParaRPr lang="en-US">
+              <a:latin typeface="Arial" panose="020B0604020202020204" pitchFamily="34" charset="0"/>
+              <a:cs typeface="Arial" panose="020B0604020202020204" pitchFamily="34" charset="0"/>
+            </a:endParaRPr>
+          </a:p>
+          <a:p>
+            <a:endParaRPr lang="en-US">
+              <a:latin typeface="Arial" panose="020B0604020202020204" pitchFamily="34" charset="0"/>
+              <a:cs typeface="Arial" panose="020B0604020202020204" pitchFamily="34" charset="0"/>
+            </a:endParaRPr>
+          </a:p>
+          <a:p>
+            <a:endParaRPr lang="en-US">
+              <a:latin typeface="Arial" panose="020B0604020202020204" pitchFamily="34" charset="0"/>
+              <a:cs typeface="Arial" panose="020B0604020202020204" pitchFamily="34" charset="0"/>
+            </a:endParaRPr>
+          </a:p>
+          <a:p>
+            <a:endParaRPr lang="en-US">
+              <a:latin typeface="Arial" panose="020B0604020202020204" pitchFamily="34" charset="0"/>
+              <a:cs typeface="Arial" panose="020B0604020202020204" pitchFamily="34" charset="0"/>
+            </a:endParaRPr>
+          </a:p>
+          <a:p>
+            <a:endParaRPr lang="en-US">
+              <a:latin typeface="Arial" panose="020B0604020202020204" pitchFamily="34" charset="0"/>
+              <a:cs typeface="Arial" panose="020B0604020202020204" pitchFamily="34" charset="0"/>
+            </a:endParaRPr>
+          </a:p>
+        </p:txBody>
+      </p:sp>
+    </p:spTree>
+    <p:extLst>
+      <p:ext uri="{BB962C8B-B14F-4D97-AF65-F5344CB8AC3E}">
+        <p14:creationId xmlns:p14="http://schemas.microsoft.com/office/powerpoint/2010/main" val="1477238895"/>
       </p:ext>
     </p:extLst>
   </p:cSld>

</xml_diff>